<commit_message>
fixed presentation and created pdf
</commit_message>
<xml_diff>
--- a/presentation.pptx
+++ b/presentation.pptx
@@ -271,7 +271,7 @@
           <a:p>
             <a:fld id="{F61512F3-A4E3-4F5C-AC63-F682396AFD66}" type="datetimeFigureOut">
               <a:rPr lang="de-DE" smtClean="0"/>
-              <a:t>22.01.2021</a:t>
+              <a:t>29.01.2021</a:t>
             </a:fld>
             <a:endParaRPr lang="de-DE"/>
           </a:p>
@@ -469,7 +469,7 @@
           <a:p>
             <a:fld id="{F61512F3-A4E3-4F5C-AC63-F682396AFD66}" type="datetimeFigureOut">
               <a:rPr lang="de-DE" smtClean="0"/>
-              <a:t>22.01.2021</a:t>
+              <a:t>29.01.2021</a:t>
             </a:fld>
             <a:endParaRPr lang="de-DE"/>
           </a:p>
@@ -677,7 +677,7 @@
           <a:p>
             <a:fld id="{F61512F3-A4E3-4F5C-AC63-F682396AFD66}" type="datetimeFigureOut">
               <a:rPr lang="de-DE" smtClean="0"/>
-              <a:t>22.01.2021</a:t>
+              <a:t>29.01.2021</a:t>
             </a:fld>
             <a:endParaRPr lang="de-DE"/>
           </a:p>
@@ -875,7 +875,7 @@
           <a:p>
             <a:fld id="{F61512F3-A4E3-4F5C-AC63-F682396AFD66}" type="datetimeFigureOut">
               <a:rPr lang="de-DE" smtClean="0"/>
-              <a:t>22.01.2021</a:t>
+              <a:t>29.01.2021</a:t>
             </a:fld>
             <a:endParaRPr lang="de-DE"/>
           </a:p>
@@ -1150,7 +1150,7 @@
           <a:p>
             <a:fld id="{F61512F3-A4E3-4F5C-AC63-F682396AFD66}" type="datetimeFigureOut">
               <a:rPr lang="de-DE" smtClean="0"/>
-              <a:t>22.01.2021</a:t>
+              <a:t>29.01.2021</a:t>
             </a:fld>
             <a:endParaRPr lang="de-DE"/>
           </a:p>
@@ -1415,7 +1415,7 @@
           <a:p>
             <a:fld id="{F61512F3-A4E3-4F5C-AC63-F682396AFD66}" type="datetimeFigureOut">
               <a:rPr lang="de-DE" smtClean="0"/>
-              <a:t>22.01.2021</a:t>
+              <a:t>29.01.2021</a:t>
             </a:fld>
             <a:endParaRPr lang="de-DE"/>
           </a:p>
@@ -1827,7 +1827,7 @@
           <a:p>
             <a:fld id="{F61512F3-A4E3-4F5C-AC63-F682396AFD66}" type="datetimeFigureOut">
               <a:rPr lang="de-DE" smtClean="0"/>
-              <a:t>22.01.2021</a:t>
+              <a:t>29.01.2021</a:t>
             </a:fld>
             <a:endParaRPr lang="de-DE"/>
           </a:p>
@@ -1968,7 +1968,7 @@
           <a:p>
             <a:fld id="{F61512F3-A4E3-4F5C-AC63-F682396AFD66}" type="datetimeFigureOut">
               <a:rPr lang="de-DE" smtClean="0"/>
-              <a:t>22.01.2021</a:t>
+              <a:t>29.01.2021</a:t>
             </a:fld>
             <a:endParaRPr lang="de-DE"/>
           </a:p>
@@ -2081,7 +2081,7 @@
           <a:p>
             <a:fld id="{F61512F3-A4E3-4F5C-AC63-F682396AFD66}" type="datetimeFigureOut">
               <a:rPr lang="de-DE" smtClean="0"/>
-              <a:t>22.01.2021</a:t>
+              <a:t>29.01.2021</a:t>
             </a:fld>
             <a:endParaRPr lang="de-DE"/>
           </a:p>
@@ -2392,7 +2392,7 @@
           <a:p>
             <a:fld id="{F61512F3-A4E3-4F5C-AC63-F682396AFD66}" type="datetimeFigureOut">
               <a:rPr lang="de-DE" smtClean="0"/>
-              <a:t>22.01.2021</a:t>
+              <a:t>29.01.2021</a:t>
             </a:fld>
             <a:endParaRPr lang="de-DE"/>
           </a:p>
@@ -2680,7 +2680,7 @@
           <a:p>
             <a:fld id="{F61512F3-A4E3-4F5C-AC63-F682396AFD66}" type="datetimeFigureOut">
               <a:rPr lang="de-DE" smtClean="0"/>
-              <a:t>22.01.2021</a:t>
+              <a:t>29.01.2021</a:t>
             </a:fld>
             <a:endParaRPr lang="de-DE"/>
           </a:p>
@@ -2921,7 +2921,7 @@
           <a:p>
             <a:fld id="{F61512F3-A4E3-4F5C-AC63-F682396AFD66}" type="datetimeFigureOut">
               <a:rPr lang="de-DE" smtClean="0"/>
-              <a:t>22.01.2021</a:t>
+              <a:t>29.01.2021</a:t>
             </a:fld>
             <a:endParaRPr lang="de-DE"/>
           </a:p>
@@ -4105,13 +4105,6 @@
             </a:r>
           </a:p>
           <a:p>
-            <a:pPr lvl="1"/>
-            <a:r>
-              <a:rPr lang="en-GB" dirty="0"/>
-              <a:t>Let Human Decide (for optimal score)</a:t>
-            </a:r>
-          </a:p>
-          <a:p>
             <a:r>
               <a:rPr lang="en-GB" dirty="0"/>
               <a:t>Result:</a:t>
@@ -5634,7 +5627,7 @@
           <a:p>
             <a:r>
               <a:rPr lang="en-US" dirty="0"/>
-              <a:t>Also shown By </a:t>
+              <a:t>Also shown by </a:t>
             </a:r>
             <a:br>
               <a:rPr lang="en-US" dirty="0"/>

</xml_diff>